<commit_message>
added thesis graphs and finished presentation
</commit_message>
<xml_diff>
--- a/paper/ANDRÉ_NEVES__PHDPOSTERNOVALINCS2018.pptx
+++ b/paper/ANDRÉ_NEVES__PHDPOSTERNOVALINCS2018.pptx
@@ -205,7 +205,7 @@
           <a:p>
             <a:fld id="{E97DE7B4-F8D4-4C59-B121-0FC6CADF199F}" type="datetimeFigureOut">
               <a:rPr lang="en-GB" smtClean="0"/>
-              <a:t>20/08/2019</a:t>
+              <a:t>28/08/2019</a:t>
             </a:fld>
             <a:endParaRPr lang="en-GB"/>
           </a:p>
@@ -1677,7 +1677,7 @@
           </a:ln>
           <a:extLst>
             <a:ext uri="{C572A759-6A51-4108-AA02-DFA0A04FC94B}">
-              <ma14:wrappingTextBoxFlag xmlns:ma14="http://schemas.microsoft.com/office/mac/drawingml/2011/main" xmlns="" val="1"/>
+              <ma14:wrappingTextBoxFlag xmlns="" xmlns:ma14="http://schemas.microsoft.com/office/mac/drawingml/2011/main" val="1"/>
             </a:ext>
           </a:extLst>
         </p:spPr>
@@ -1720,7 +1720,7 @@
           </a:ln>
           <a:extLst>
             <a:ext uri="{C572A759-6A51-4108-AA02-DFA0A04FC94B}">
-              <ma14:wrappingTextBoxFlag xmlns:ma14="http://schemas.microsoft.com/office/mac/drawingml/2011/main" xmlns="" val="1"/>
+              <ma14:wrappingTextBoxFlag xmlns="" xmlns:ma14="http://schemas.microsoft.com/office/mac/drawingml/2011/main" val="1"/>
             </a:ext>
           </a:extLst>
         </p:spPr>
@@ -2248,7 +2248,7 @@
           </a:effectLst>
           <a:extLst>
             <a:ext uri="{C572A759-6A51-4108-AA02-DFA0A04FC94B}">
-              <ma14:wrappingTextBoxFlag xmlns:ma14="http://schemas.microsoft.com/office/mac/drawingml/2011/main" xmlns="" val="1"/>
+              <ma14:wrappingTextBoxFlag xmlns="" xmlns:ma14="http://schemas.microsoft.com/office/mac/drawingml/2011/main" val="1"/>
             </a:ext>
           </a:extLst>
         </p:spPr>
@@ -2334,7 +2334,7 @@
           </a:ln>
           <a:extLst>
             <a:ext uri="{C572A759-6A51-4108-AA02-DFA0A04FC94B}">
-              <ma14:wrappingTextBoxFlag xmlns:ma14="http://schemas.microsoft.com/office/mac/drawingml/2011/main" xmlns="" val="1"/>
+              <ma14:wrappingTextBoxFlag xmlns="" xmlns:ma14="http://schemas.microsoft.com/office/mac/drawingml/2011/main" val="1"/>
             </a:ext>
           </a:extLst>
         </p:spPr>
@@ -2448,7 +2448,7 @@
                 <a:cs typeface="Arial"/>
                 <a:sym typeface="Arial"/>
               </a:rPr>
-              <a:t>Resolução especial não adequada</a:t>
+              <a:t>Resolução espacial não adequada</a:t>
             </a:r>
           </a:p>
           <a:p>
@@ -2576,7 +2576,7 @@
           </a:ln>
           <a:extLst>
             <a:ext uri="{C572A759-6A51-4108-AA02-DFA0A04FC94B}">
-              <ma14:wrappingTextBoxFlag xmlns:ma14="http://schemas.microsoft.com/office/mac/drawingml/2011/main" xmlns="" val="1"/>
+              <ma14:wrappingTextBoxFlag xmlns="" xmlns:ma14="http://schemas.microsoft.com/office/mac/drawingml/2011/main" val="1"/>
             </a:ext>
           </a:extLst>
         </p:spPr>
@@ -2624,8 +2624,8 @@
         </p:nvSpPr>
         <p:spPr>
           <a:xfrm>
-            <a:off x="23442138" y="4669051"/>
-            <a:ext cx="6663320" cy="3070390"/>
+            <a:off x="23442138" y="4545940"/>
+            <a:ext cx="6663320" cy="3316612"/>
           </a:xfrm>
           <a:prstGeom prst="rect">
             <a:avLst/>
@@ -2635,7 +2635,7 @@
           </a:ln>
           <a:extLst>
             <a:ext uri="{C572A759-6A51-4108-AA02-DFA0A04FC94B}">
-              <ma14:wrappingTextBoxFlag xmlns:ma14="http://schemas.microsoft.com/office/mac/drawingml/2011/main" xmlns="" val="1"/>
+              <ma14:wrappingTextBoxFlag xmlns="" xmlns:ma14="http://schemas.microsoft.com/office/mac/drawingml/2011/main" val="1"/>
             </a:ext>
           </a:extLst>
         </p:spPr>
@@ -2676,7 +2676,23 @@
                   <a:schemeClr val="bg1"/>
                 </a:solidFill>
               </a:rPr>
-              <a:t>MSc in Computer Science</a:t>
+              <a:t>MSc in Computer Science </a:t>
+            </a:r>
+            <a:r>
+              <a:rPr lang="en-US" sz="3600" b="1" dirty="0" err="1">
+                <a:solidFill>
+                  <a:schemeClr val="bg1"/>
+                </a:solidFill>
+              </a:rPr>
+              <a:t>Orientação</a:t>
+            </a:r>
+            <a:r>
+              <a:rPr lang="en-US" sz="3600" b="1" dirty="0">
+                <a:solidFill>
+                  <a:schemeClr val="bg1"/>
+                </a:solidFill>
+              </a:rPr>
+              <a:t>: </a:t>
             </a:r>
           </a:p>
           <a:p>
@@ -2691,34 +2707,6 @@
               </a:defRPr>
             </a:pPr>
             <a:r>
-              <a:rPr lang="en-US" sz="3600" b="1" dirty="0" err="1">
-                <a:solidFill>
-                  <a:schemeClr val="bg1"/>
-                </a:solidFill>
-              </a:rPr>
-              <a:t>Orientação</a:t>
-            </a:r>
-            <a:r>
-              <a:rPr lang="en-US" sz="3600" b="1" dirty="0">
-                <a:solidFill>
-                  <a:schemeClr val="bg1"/>
-                </a:solidFill>
-              </a:rPr>
-              <a:t>: </a:t>
-            </a:r>
-          </a:p>
-          <a:p>
-            <a:pPr lvl="0">
-              <a:spcAft>
-                <a:spcPts val="1200"/>
-              </a:spcAft>
-              <a:defRPr sz="1800" b="0">
-                <a:solidFill>
-                  <a:srgbClr val="000000"/>
-                </a:solidFill>
-              </a:defRPr>
-            </a:pPr>
-            <a:r>
               <a:rPr lang="en-US" sz="3600" b="1" dirty="0">
                 <a:solidFill>
                   <a:schemeClr val="bg1"/>
@@ -2733,6 +2721,14 @@
                 </a:solidFill>
               </a:rPr>
               <a:t>Damásio</a:t>
+            </a:r>
+            <a:r>
+              <a:rPr lang="en-US" sz="3600" b="1" dirty="0">
+                <a:solidFill>
+                  <a:schemeClr val="bg1"/>
+                </a:solidFill>
+              </a:rPr>
+              <a:t> </a:t>
             </a:r>
             <a:br>
               <a:rPr lang="en-US" sz="3600" b="1" dirty="0">
@@ -2747,8 +2743,29 @@
                   <a:schemeClr val="bg1"/>
                 </a:solidFill>
               </a:rPr>
-              <a:t>	João M. Pires</a:t>
-            </a:r>
+              <a:t>	João M. Pires                  	Fernando </a:t>
+            </a:r>
+            <a:r>
+              <a:rPr lang="en-US" sz="3600" b="1" dirty="0" err="1">
+                <a:solidFill>
+                  <a:schemeClr val="bg1"/>
+                </a:solidFill>
+              </a:rPr>
+              <a:t>Birra</a:t>
+            </a:r>
+            <a:r>
+              <a:rPr lang="en-US" sz="3600" b="1" dirty="0">
+                <a:solidFill>
+                  <a:schemeClr val="bg1"/>
+                </a:solidFill>
+              </a:rPr>
+              <a:t>  </a:t>
+            </a:r>
+            <a:endParaRPr lang="en-US" sz="3600" dirty="0">
+              <a:solidFill>
+                <a:schemeClr val="bg1"/>
+              </a:solidFill>
+            </a:endParaRPr>
           </a:p>
         </p:txBody>
       </p:sp>
@@ -2771,7 +2788,7 @@
           </a:ln>
           <a:extLst>
             <a:ext uri="{C572A759-6A51-4108-AA02-DFA0A04FC94B}">
-              <ma14:wrappingTextBoxFlag xmlns:ma14="http://schemas.microsoft.com/office/mac/drawingml/2011/main" xmlns="" val="1"/>
+              <ma14:wrappingTextBoxFlag xmlns="" xmlns:ma14="http://schemas.microsoft.com/office/mac/drawingml/2011/main" val="1"/>
             </a:ext>
           </a:extLst>
         </p:spPr>
@@ -3478,7 +3495,7 @@
         </p:blipFill>
         <p:spPr>
           <a:xfrm>
-            <a:off x="15415734" y="35129669"/>
+            <a:off x="15457615" y="34925352"/>
             <a:ext cx="14711917" cy="6910879"/>
           </a:xfrm>
           <a:prstGeom prst="rect">
@@ -3570,7 +3587,7 @@
         </p:nvSpPr>
         <p:spPr>
           <a:xfrm>
-            <a:off x="15415734" y="34125655"/>
+            <a:off x="15457615" y="33921338"/>
             <a:ext cx="14689723" cy="885309"/>
           </a:xfrm>
           <a:prstGeom prst="rect">
@@ -3581,7 +3598,7 @@
           </a:ln>
           <a:extLst>
             <a:ext uri="{C572A759-6A51-4108-AA02-DFA0A04FC94B}">
-              <ma14:wrappingTextBoxFlag xmlns:ma14="http://schemas.microsoft.com/office/mac/drawingml/2011/main" xmlns="" val="1"/>
+              <ma14:wrappingTextBoxFlag xmlns="" xmlns:ma14="http://schemas.microsoft.com/office/mac/drawingml/2011/main" val="1"/>
             </a:ext>
           </a:extLst>
         </p:spPr>
@@ -3644,8 +3661,8 @@
         </p:nvSpPr>
         <p:spPr>
           <a:xfrm>
-            <a:off x="-1723783" y="33317289"/>
-            <a:ext cx="18533552" cy="885309"/>
+            <a:off x="-576887" y="33347865"/>
+            <a:ext cx="16731648" cy="885309"/>
           </a:xfrm>
           <a:prstGeom prst="rect">
             <a:avLst/>
@@ -3655,7 +3672,7 @@
           </a:ln>
           <a:extLst>
             <a:ext uri="{C572A759-6A51-4108-AA02-DFA0A04FC94B}">
-              <ma14:wrappingTextBoxFlag xmlns:ma14="http://schemas.microsoft.com/office/mac/drawingml/2011/main" xmlns="" val="1"/>
+              <ma14:wrappingTextBoxFlag xmlns="" xmlns:ma14="http://schemas.microsoft.com/office/mac/drawingml/2011/main" val="1"/>
             </a:ext>
           </a:extLst>
         </p:spPr>
@@ -3678,7 +3695,7 @@
                 <a:cs typeface="Arial"/>
                 <a:sym typeface="Arial"/>
               </a:rPr>
-              <a:t>Carta </a:t>
+              <a:t>Carta GHSL </a:t>
             </a:r>
             <a:r>
               <a:rPr lang="pt-PT" sz="4800" b="1" dirty="0" err="1">
@@ -3762,7 +3779,7 @@
           </a:ln>
           <a:extLst>
             <a:ext uri="{C572A759-6A51-4108-AA02-DFA0A04FC94B}">
-              <ma14:wrappingTextBoxFlag xmlns:ma14="http://schemas.microsoft.com/office/mac/drawingml/2011/main" xmlns="" val="1"/>
+              <ma14:wrappingTextBoxFlag xmlns="" xmlns:ma14="http://schemas.microsoft.com/office/mac/drawingml/2011/main" val="1"/>
             </a:ext>
           </a:extLst>
         </p:spPr>
@@ -3895,7 +3912,7 @@
                 <a:cs typeface="Arial"/>
                 <a:sym typeface="Arial"/>
               </a:rPr>
-              <a:t>Segmentação de estruturas</a:t>
+              <a:t>Diferenciação de estruturas</a:t>
             </a:r>
             <a:r>
               <a:rPr lang="pt-PT" sz="4800" dirty="0">
@@ -4038,7 +4055,7 @@
           </a:ln>
           <a:extLst>
             <a:ext uri="{C572A759-6A51-4108-AA02-DFA0A04FC94B}">
-              <ma14:wrappingTextBoxFlag xmlns:ma14="http://schemas.microsoft.com/office/mac/drawingml/2011/main" xmlns="" val="1"/>
+              <ma14:wrappingTextBoxFlag xmlns="" xmlns:ma14="http://schemas.microsoft.com/office/mac/drawingml/2011/main" val="1"/>
             </a:ext>
           </a:extLst>
         </p:spPr>
@@ -5177,7 +5194,7 @@
           </a:ln>
           <a:extLst>
             <a:ext uri="{C572A759-6A51-4108-AA02-DFA0A04FC94B}">
-              <ma14:wrappingTextBoxFlag xmlns:ma14="http://schemas.microsoft.com/office/mac/drawingml/2011/main" xmlns="" val="1"/>
+              <ma14:wrappingTextBoxFlag xmlns="" xmlns:ma14="http://schemas.microsoft.com/office/mac/drawingml/2011/main" val="1"/>
             </a:ext>
           </a:extLst>
         </p:spPr>

</xml_diff>